<commit_message>
revision v2 minor editorial changes to figure lables
</commit_message>
<xml_diff>
--- a/figs/Figures.pptx
+++ b/figs/Figures.pptx
@@ -10,7 +10,7 @@
   <p:sldIdLst>
     <p:sldId id="260" r:id="rId2"/>
     <p:sldId id="293" r:id="rId3"/>
-    <p:sldId id="299" r:id="rId4"/>
+    <p:sldId id="300" r:id="rId4"/>
   </p:sldIdLst>
   <p:sldSz cx="12192000" cy="6858000"/>
   <p:notesSz cx="6858000" cy="9144000"/>
@@ -120,7 +120,7 @@
 <file path=ppt/revisionInfo.xml><?xml version="1.0" encoding="utf-8"?>
 <p1510:revInfo xmlns:a="http://schemas.openxmlformats.org/drawingml/2006/main" xmlns:r="http://schemas.openxmlformats.org/officeDocument/2006/relationships" xmlns:p1510="http://schemas.microsoft.com/office/powerpoint/2015/10/main">
   <p1510:revLst>
-    <p1510:client id="{AAD5E43F-83D4-40E5-B269-36476E1B3F4B}" v="2" dt="2025-07-31T01:00:26.357"/>
+    <p1510:client id="{29403720-2EA4-4C86-B320-D56135136C30}" v="7" dt="2026-02-07T19:09:55.111"/>
   </p1510:revLst>
 </p1510:revInfo>
 </file>
@@ -128,679 +128,119 @@
 <file path=ppt/changesInfos/changesInfo1.xml><?xml version="1.0" encoding="utf-8"?>
 <pc:chgInfo xmlns:a="http://schemas.openxmlformats.org/drawingml/2006/main" xmlns:r="http://schemas.openxmlformats.org/officeDocument/2006/relationships" xmlns:ac="http://schemas.microsoft.com/office/drawing/2013/main/command" xmlns:pc="http://schemas.microsoft.com/office/powerpoint/2013/main/command">
   <pc:docChgLst>
-    <pc:chgData name="Chakrawal, Arjun" userId="1b69a048-c6a1-4e41-816d-1e92891910c1" providerId="ADAL" clId="{AAD5E43F-83D4-40E5-B269-36476E1B3F4B}"/>
-    <pc:docChg chg="modSld">
-      <pc:chgData name="Chakrawal, Arjun" userId="1b69a048-c6a1-4e41-816d-1e92891910c1" providerId="ADAL" clId="{AAD5E43F-83D4-40E5-B269-36476E1B3F4B}" dt="2025-07-31T01:00:26.357" v="11" actId="164"/>
+    <pc:chgData name="Chakrawal, Arjun" userId="1b69a048-c6a1-4e41-816d-1e92891910c1" providerId="ADAL" clId="{CCC3BBF2-12F1-464E-BA5E-AA5BA086ED71}"/>
+    <pc:docChg chg="custSel addSld delSld modSld">
+      <pc:chgData name="Chakrawal, Arjun" userId="1b69a048-c6a1-4e41-816d-1e92891910c1" providerId="ADAL" clId="{CCC3BBF2-12F1-464E-BA5E-AA5BA086ED71}" dt="2026-02-07T20:03:25.018" v="45" actId="47"/>
       <pc:docMkLst>
         <pc:docMk/>
       </pc:docMkLst>
-      <pc:sldChg chg="addSp modSp mod">
-        <pc:chgData name="Chakrawal, Arjun" userId="1b69a048-c6a1-4e41-816d-1e92891910c1" providerId="ADAL" clId="{AAD5E43F-83D4-40E5-B269-36476E1B3F4B}" dt="2025-07-31T01:00:26.357" v="11" actId="164"/>
-        <pc:sldMkLst>
-          <pc:docMk/>
-          <pc:sldMk cId="3794856077" sldId="293"/>
-        </pc:sldMkLst>
-        <pc:spChg chg="add mod ord">
-          <ac:chgData name="Chakrawal, Arjun" userId="1b69a048-c6a1-4e41-816d-1e92891910c1" providerId="ADAL" clId="{AAD5E43F-83D4-40E5-B269-36476E1B3F4B}" dt="2025-07-31T01:00:26.357" v="11" actId="164"/>
-          <ac:spMkLst>
-            <pc:docMk/>
-            <pc:sldMk cId="3794856077" sldId="293"/>
-            <ac:spMk id="2" creationId="{CA655744-F453-7B31-A2F8-4C7020314CCC}"/>
-          </ac:spMkLst>
-        </pc:spChg>
-        <pc:grpChg chg="add mod">
-          <ac:chgData name="Chakrawal, Arjun" userId="1b69a048-c6a1-4e41-816d-1e92891910c1" providerId="ADAL" clId="{AAD5E43F-83D4-40E5-B269-36476E1B3F4B}" dt="2025-07-31T01:00:26.357" v="11" actId="164"/>
-          <ac:grpSpMkLst>
-            <pc:docMk/>
-            <pc:sldMk cId="3794856077" sldId="293"/>
-            <ac:grpSpMk id="4" creationId="{58D0649E-BD2C-7587-A43E-7289DA85C0C1}"/>
-          </ac:grpSpMkLst>
-        </pc:grpChg>
-        <pc:grpChg chg="mod">
-          <ac:chgData name="Chakrawal, Arjun" userId="1b69a048-c6a1-4e41-816d-1e92891910c1" providerId="ADAL" clId="{AAD5E43F-83D4-40E5-B269-36476E1B3F4B}" dt="2025-07-31T01:00:26.357" v="11" actId="164"/>
-          <ac:grpSpMkLst>
-            <pc:docMk/>
-            <pc:sldMk cId="3794856077" sldId="293"/>
-            <ac:grpSpMk id="10" creationId="{B2D7174E-4ECC-3514-6929-2BC063FB2194}"/>
-          </ac:grpSpMkLst>
-        </pc:grpChg>
-      </pc:sldChg>
-      <pc:sldChg chg="addSp modSp mod">
-        <pc:chgData name="Chakrawal, Arjun" userId="1b69a048-c6a1-4e41-816d-1e92891910c1" providerId="ADAL" clId="{AAD5E43F-83D4-40E5-B269-36476E1B3F4B}" dt="2025-07-31T01:00:07.149" v="5" actId="1076"/>
+      <pc:sldChg chg="del">
+        <pc:chgData name="Chakrawal, Arjun" userId="1b69a048-c6a1-4e41-816d-1e92891910c1" providerId="ADAL" clId="{CCC3BBF2-12F1-464E-BA5E-AA5BA086ED71}" dt="2026-02-07T20:03:25.018" v="45" actId="47"/>
         <pc:sldMkLst>
           <pc:docMk/>
           <pc:sldMk cId="2091496340" sldId="299"/>
         </pc:sldMkLst>
-        <pc:spChg chg="add mod ord">
-          <ac:chgData name="Chakrawal, Arjun" userId="1b69a048-c6a1-4e41-816d-1e92891910c1" providerId="ADAL" clId="{AAD5E43F-83D4-40E5-B269-36476E1B3F4B}" dt="2025-07-31T00:59:53.951" v="4" actId="164"/>
+      </pc:sldChg>
+      <pc:sldChg chg="addSp delSp modSp add mod">
+        <pc:chgData name="Chakrawal, Arjun" userId="1b69a048-c6a1-4e41-816d-1e92891910c1" providerId="ADAL" clId="{CCC3BBF2-12F1-464E-BA5E-AA5BA086ED71}" dt="2026-02-07T19:09:56.592" v="44" actId="21"/>
+        <pc:sldMkLst>
+          <pc:docMk/>
+          <pc:sldMk cId="1333682676" sldId="300"/>
+        </pc:sldMkLst>
+        <pc:spChg chg="mod topLvl">
+          <ac:chgData name="Chakrawal, Arjun" userId="1b69a048-c6a1-4e41-816d-1e92891910c1" providerId="ADAL" clId="{CCC3BBF2-12F1-464E-BA5E-AA5BA086ED71}" dt="2026-02-07T19:09:45.015" v="41" actId="164"/>
           <ac:spMkLst>
             <pc:docMk/>
-            <pc:sldMk cId="2091496340" sldId="299"/>
-            <ac:spMk id="2" creationId="{B87DC352-FDEE-DD67-3BA0-02473E78C1CF}"/>
-          </ac:spMkLst>
-        </pc:spChg>
-        <pc:grpChg chg="add mod">
-          <ac:chgData name="Chakrawal, Arjun" userId="1b69a048-c6a1-4e41-816d-1e92891910c1" providerId="ADAL" clId="{AAD5E43F-83D4-40E5-B269-36476E1B3F4B}" dt="2025-07-31T01:00:07.149" v="5" actId="1076"/>
-          <ac:grpSpMkLst>
-            <pc:docMk/>
-            <pc:sldMk cId="2091496340" sldId="299"/>
-            <ac:grpSpMk id="3" creationId="{7C12CCDE-C4F1-17D4-F737-CF6A95A7CDDC}"/>
-          </ac:grpSpMkLst>
-        </pc:grpChg>
-        <pc:grpChg chg="mod">
-          <ac:chgData name="Chakrawal, Arjun" userId="1b69a048-c6a1-4e41-816d-1e92891910c1" providerId="ADAL" clId="{AAD5E43F-83D4-40E5-B269-36476E1B3F4B}" dt="2025-07-31T00:59:53.951" v="4" actId="164"/>
-          <ac:grpSpMkLst>
-            <pc:docMk/>
-            <pc:sldMk cId="2091496340" sldId="299"/>
-            <ac:grpSpMk id="14" creationId="{C2FA4C28-3FAD-3C40-5C8A-9A545AA24AD0}"/>
-          </ac:grpSpMkLst>
-        </pc:grpChg>
-      </pc:sldChg>
-    </pc:docChg>
-  </pc:docChgLst>
-  <pc:docChgLst>
-    <pc:chgData name="Chakrawal, Arjun" userId="1b69a048-c6a1-4e41-816d-1e92891910c1" providerId="ADAL" clId="{8F223F2B-44B6-4956-91CA-EF5BE76E4BA2}"/>
-    <pc:docChg chg="custSel addSld delSld modSld">
-      <pc:chgData name="Chakrawal, Arjun" userId="1b69a048-c6a1-4e41-816d-1e92891910c1" providerId="ADAL" clId="{8F223F2B-44B6-4956-91CA-EF5BE76E4BA2}" dt="2025-06-28T05:09:32.296" v="70" actId="21"/>
-      <pc:docMkLst>
-        <pc:docMk/>
-      </pc:docMkLst>
-      <pc:sldChg chg="addSp delSp modSp mod">
-        <pc:chgData name="Chakrawal, Arjun" userId="1b69a048-c6a1-4e41-816d-1e92891910c1" providerId="ADAL" clId="{8F223F2B-44B6-4956-91CA-EF5BE76E4BA2}" dt="2025-06-18T22:05:31.345" v="46" actId="21"/>
-        <pc:sldMkLst>
-          <pc:docMk/>
-          <pc:sldMk cId="3322854550" sldId="260"/>
-        </pc:sldMkLst>
-        <pc:spChg chg="mod topLvl">
-          <ac:chgData name="Chakrawal, Arjun" userId="1b69a048-c6a1-4e41-816d-1e92891910c1" providerId="ADAL" clId="{8F223F2B-44B6-4956-91CA-EF5BE76E4BA2}" dt="2025-06-18T22:04:56.356" v="23" actId="165"/>
-          <ac:spMkLst>
-            <pc:docMk/>
-            <pc:sldMk cId="3322854550" sldId="260"/>
-            <ac:spMk id="23" creationId="{35E6533C-B31C-0333-CC85-A3821E757419}"/>
+            <pc:sldMk cId="1333682676" sldId="300"/>
+            <ac:spMk id="2" creationId="{DA6E867A-F8FB-A328-79F4-A78837510CA0}"/>
           </ac:spMkLst>
         </pc:spChg>
         <pc:spChg chg="mod topLvl">
-          <ac:chgData name="Chakrawal, Arjun" userId="1b69a048-c6a1-4e41-816d-1e92891910c1" providerId="ADAL" clId="{8F223F2B-44B6-4956-91CA-EF5BE76E4BA2}" dt="2025-06-18T22:04:56.356" v="23" actId="165"/>
+          <ac:chgData name="Chakrawal, Arjun" userId="1b69a048-c6a1-4e41-816d-1e92891910c1" providerId="ADAL" clId="{CCC3BBF2-12F1-464E-BA5E-AA5BA086ED71}" dt="2026-02-07T19:09:41.959" v="40" actId="1036"/>
           <ac:spMkLst>
             <pc:docMk/>
-            <pc:sldMk cId="3322854550" sldId="260"/>
-            <ac:spMk id="29" creationId="{5F3D2F87-E5FD-3ADD-06E3-DA55D05C5615}"/>
+            <pc:sldMk cId="1333682676" sldId="300"/>
+            <ac:spMk id="22" creationId="{D08B6605-DE80-537C-6C16-A423B3CD9F31}"/>
           </ac:spMkLst>
         </pc:spChg>
         <pc:spChg chg="mod topLvl">
-          <ac:chgData name="Chakrawal, Arjun" userId="1b69a048-c6a1-4e41-816d-1e92891910c1" providerId="ADAL" clId="{8F223F2B-44B6-4956-91CA-EF5BE76E4BA2}" dt="2025-06-18T22:04:56.356" v="23" actId="165"/>
+          <ac:chgData name="Chakrawal, Arjun" userId="1b69a048-c6a1-4e41-816d-1e92891910c1" providerId="ADAL" clId="{CCC3BBF2-12F1-464E-BA5E-AA5BA086ED71}" dt="2026-02-07T19:09:41.959" v="40" actId="1036"/>
           <ac:spMkLst>
             <pc:docMk/>
-            <pc:sldMk cId="3322854550" sldId="260"/>
-            <ac:spMk id="30" creationId="{2DA025EA-1291-6C58-B49D-0C819E9E3227}"/>
+            <pc:sldMk cId="1333682676" sldId="300"/>
+            <ac:spMk id="23" creationId="{0EDA72DF-FC57-3EDD-763F-2B7F799B270A}"/>
           </ac:spMkLst>
         </pc:spChg>
-        <pc:spChg chg="mod topLvl">
-          <ac:chgData name="Chakrawal, Arjun" userId="1b69a048-c6a1-4e41-816d-1e92891910c1" providerId="ADAL" clId="{8F223F2B-44B6-4956-91CA-EF5BE76E4BA2}" dt="2025-06-18T22:04:56.356" v="23" actId="165"/>
-          <ac:spMkLst>
-            <pc:docMk/>
-            <pc:sldMk cId="3322854550" sldId="260"/>
-            <ac:spMk id="32" creationId="{14E82596-97F3-7CEB-DA5A-FFDCFDD5C053}"/>
-          </ac:spMkLst>
-        </pc:spChg>
-        <pc:spChg chg="mod topLvl">
-          <ac:chgData name="Chakrawal, Arjun" userId="1b69a048-c6a1-4e41-816d-1e92891910c1" providerId="ADAL" clId="{8F223F2B-44B6-4956-91CA-EF5BE76E4BA2}" dt="2025-06-18T22:04:56.356" v="23" actId="165"/>
-          <ac:spMkLst>
-            <pc:docMk/>
-            <pc:sldMk cId="3322854550" sldId="260"/>
-            <ac:spMk id="33" creationId="{2DAD43A2-D264-6E32-E2B2-817F3A281CBA}"/>
-          </ac:spMkLst>
-        </pc:spChg>
-        <pc:spChg chg="mod topLvl">
-          <ac:chgData name="Chakrawal, Arjun" userId="1b69a048-c6a1-4e41-816d-1e92891910c1" providerId="ADAL" clId="{8F223F2B-44B6-4956-91CA-EF5BE76E4BA2}" dt="2025-06-18T22:05:16.705" v="43" actId="122"/>
-          <ac:spMkLst>
-            <pc:docMk/>
-            <pc:sldMk cId="3322854550" sldId="260"/>
-            <ac:spMk id="34" creationId="{58812C4F-14E7-BBF9-B582-997102CFF301}"/>
-          </ac:spMkLst>
-        </pc:spChg>
-        <pc:spChg chg="mod topLvl">
-          <ac:chgData name="Chakrawal, Arjun" userId="1b69a048-c6a1-4e41-816d-1e92891910c1" providerId="ADAL" clId="{8F223F2B-44B6-4956-91CA-EF5BE76E4BA2}" dt="2025-06-18T22:04:56.356" v="23" actId="165"/>
-          <ac:spMkLst>
-            <pc:docMk/>
-            <pc:sldMk cId="3322854550" sldId="260"/>
-            <ac:spMk id="35" creationId="{2CF6F9BC-92BC-BADB-8BAD-37E72E992E92}"/>
-          </ac:spMkLst>
-        </pc:spChg>
-        <pc:spChg chg="mod topLvl">
-          <ac:chgData name="Chakrawal, Arjun" userId="1b69a048-c6a1-4e41-816d-1e92891910c1" providerId="ADAL" clId="{8F223F2B-44B6-4956-91CA-EF5BE76E4BA2}" dt="2025-06-18T22:04:56.356" v="23" actId="165"/>
-          <ac:spMkLst>
-            <pc:docMk/>
-            <pc:sldMk cId="3322854550" sldId="260"/>
-            <ac:spMk id="36" creationId="{43180FB5-07D9-AEEE-D739-09CBA8F70DF0}"/>
-          </ac:spMkLst>
-        </pc:spChg>
-        <pc:spChg chg="mod topLvl">
-          <ac:chgData name="Chakrawal, Arjun" userId="1b69a048-c6a1-4e41-816d-1e92891910c1" providerId="ADAL" clId="{8F223F2B-44B6-4956-91CA-EF5BE76E4BA2}" dt="2025-06-18T22:04:56.356" v="23" actId="165"/>
-          <ac:spMkLst>
-            <pc:docMk/>
-            <pc:sldMk cId="3322854550" sldId="260"/>
-            <ac:spMk id="62" creationId="{AAB504AC-BEB2-0171-2809-E36D29A33E2A}"/>
-          </ac:spMkLst>
-        </pc:spChg>
-        <pc:spChg chg="mod topLvl">
-          <ac:chgData name="Chakrawal, Arjun" userId="1b69a048-c6a1-4e41-816d-1e92891910c1" providerId="ADAL" clId="{8F223F2B-44B6-4956-91CA-EF5BE76E4BA2}" dt="2025-06-18T22:04:56.356" v="23" actId="165"/>
-          <ac:spMkLst>
-            <pc:docMk/>
-            <pc:sldMk cId="3322854550" sldId="260"/>
-            <ac:spMk id="67" creationId="{B10E191C-1CFE-C9D5-BE91-0B6205F15F69}"/>
-          </ac:spMkLst>
-        </pc:spChg>
-      </pc:sldChg>
-      <pc:sldChg chg="del">
-        <pc:chgData name="Chakrawal, Arjun" userId="1b69a048-c6a1-4e41-816d-1e92891910c1" providerId="ADAL" clId="{8F223F2B-44B6-4956-91CA-EF5BE76E4BA2}" dt="2025-06-18T22:03:35.251" v="2" actId="47"/>
-        <pc:sldMkLst>
-          <pc:docMk/>
-          <pc:sldMk cId="1400608726" sldId="262"/>
-        </pc:sldMkLst>
-      </pc:sldChg>
-      <pc:sldChg chg="del">
-        <pc:chgData name="Chakrawal, Arjun" userId="1b69a048-c6a1-4e41-816d-1e92891910c1" providerId="ADAL" clId="{8F223F2B-44B6-4956-91CA-EF5BE76E4BA2}" dt="2025-06-18T22:05:40.352" v="47" actId="47"/>
-        <pc:sldMkLst>
-          <pc:docMk/>
-          <pc:sldMk cId="457362576" sldId="265"/>
-        </pc:sldMkLst>
-      </pc:sldChg>
-      <pc:sldChg chg="del">
-        <pc:chgData name="Chakrawal, Arjun" userId="1b69a048-c6a1-4e41-816d-1e92891910c1" providerId="ADAL" clId="{8F223F2B-44B6-4956-91CA-EF5BE76E4BA2}" dt="2025-06-18T22:03:39.953" v="5" actId="47"/>
-        <pc:sldMkLst>
-          <pc:docMk/>
-          <pc:sldMk cId="3208300531" sldId="269"/>
-        </pc:sldMkLst>
-      </pc:sldChg>
-      <pc:sldChg chg="del">
-        <pc:chgData name="Chakrawal, Arjun" userId="1b69a048-c6a1-4e41-816d-1e92891910c1" providerId="ADAL" clId="{8F223F2B-44B6-4956-91CA-EF5BE76E4BA2}" dt="2025-06-18T22:03:32.607" v="1" actId="47"/>
-        <pc:sldMkLst>
-          <pc:docMk/>
-          <pc:sldMk cId="208848701" sldId="272"/>
-        </pc:sldMkLst>
-      </pc:sldChg>
-      <pc:sldChg chg="del">
-        <pc:chgData name="Chakrawal, Arjun" userId="1b69a048-c6a1-4e41-816d-1e92891910c1" providerId="ADAL" clId="{8F223F2B-44B6-4956-91CA-EF5BE76E4BA2}" dt="2025-06-18T22:03:28.542" v="0" actId="47"/>
-        <pc:sldMkLst>
-          <pc:docMk/>
-          <pc:sldMk cId="2285218977" sldId="274"/>
-        </pc:sldMkLst>
-      </pc:sldChg>
-      <pc:sldChg chg="del">
-        <pc:chgData name="Chakrawal, Arjun" userId="1b69a048-c6a1-4e41-816d-1e92891910c1" providerId="ADAL" clId="{8F223F2B-44B6-4956-91CA-EF5BE76E4BA2}" dt="2025-06-18T22:03:37.734" v="4" actId="47"/>
-        <pc:sldMkLst>
-          <pc:docMk/>
-          <pc:sldMk cId="1343405865" sldId="275"/>
-        </pc:sldMkLst>
-      </pc:sldChg>
-      <pc:sldChg chg="del">
-        <pc:chgData name="Chakrawal, Arjun" userId="1b69a048-c6a1-4e41-816d-1e92891910c1" providerId="ADAL" clId="{8F223F2B-44B6-4956-91CA-EF5BE76E4BA2}" dt="2025-06-18T22:03:36.805" v="3" actId="47"/>
-        <pc:sldMkLst>
-          <pc:docMk/>
-          <pc:sldMk cId="4291434432" sldId="277"/>
-        </pc:sldMkLst>
-      </pc:sldChg>
-      <pc:sldChg chg="del">
-        <pc:chgData name="Chakrawal, Arjun" userId="1b69a048-c6a1-4e41-816d-1e92891910c1" providerId="ADAL" clId="{8F223F2B-44B6-4956-91CA-EF5BE76E4BA2}" dt="2025-06-18T22:03:41.046" v="6" actId="47"/>
-        <pc:sldMkLst>
-          <pc:docMk/>
-          <pc:sldMk cId="4107274562" sldId="278"/>
-        </pc:sldMkLst>
-      </pc:sldChg>
-      <pc:sldChg chg="del">
-        <pc:chgData name="Chakrawal, Arjun" userId="1b69a048-c6a1-4e41-816d-1e92891910c1" providerId="ADAL" clId="{8F223F2B-44B6-4956-91CA-EF5BE76E4BA2}" dt="2025-06-18T22:03:45.278" v="8" actId="47"/>
-        <pc:sldMkLst>
-          <pc:docMk/>
-          <pc:sldMk cId="2892324527" sldId="279"/>
-        </pc:sldMkLst>
-      </pc:sldChg>
-      <pc:sldChg chg="del">
-        <pc:chgData name="Chakrawal, Arjun" userId="1b69a048-c6a1-4e41-816d-1e92891910c1" providerId="ADAL" clId="{8F223F2B-44B6-4956-91CA-EF5BE76E4BA2}" dt="2025-06-18T22:03:46.183" v="9" actId="47"/>
-        <pc:sldMkLst>
-          <pc:docMk/>
-          <pc:sldMk cId="2964470686" sldId="280"/>
-        </pc:sldMkLst>
-      </pc:sldChg>
-      <pc:sldChg chg="del">
-        <pc:chgData name="Chakrawal, Arjun" userId="1b69a048-c6a1-4e41-816d-1e92891910c1" providerId="ADAL" clId="{8F223F2B-44B6-4956-91CA-EF5BE76E4BA2}" dt="2025-06-18T22:03:42.739" v="7" actId="47"/>
-        <pc:sldMkLst>
-          <pc:docMk/>
-          <pc:sldMk cId="4273293635" sldId="282"/>
-        </pc:sldMkLst>
-      </pc:sldChg>
-      <pc:sldChg chg="del">
-        <pc:chgData name="Chakrawal, Arjun" userId="1b69a048-c6a1-4e41-816d-1e92891910c1" providerId="ADAL" clId="{8F223F2B-44B6-4956-91CA-EF5BE76E4BA2}" dt="2025-06-18T22:03:47.665" v="11" actId="47"/>
-        <pc:sldMkLst>
-          <pc:docMk/>
-          <pc:sldMk cId="2066281192" sldId="287"/>
-        </pc:sldMkLst>
-      </pc:sldChg>
-      <pc:sldChg chg="del">
-        <pc:chgData name="Chakrawal, Arjun" userId="1b69a048-c6a1-4e41-816d-1e92891910c1" providerId="ADAL" clId="{8F223F2B-44B6-4956-91CA-EF5BE76E4BA2}" dt="2025-06-18T22:03:46.784" v="10" actId="47"/>
-        <pc:sldMkLst>
-          <pc:docMk/>
-          <pc:sldMk cId="1619352745" sldId="288"/>
-        </pc:sldMkLst>
-      </pc:sldChg>
-      <pc:sldChg chg="del">
-        <pc:chgData name="Chakrawal, Arjun" userId="1b69a048-c6a1-4e41-816d-1e92891910c1" providerId="ADAL" clId="{8F223F2B-44B6-4956-91CA-EF5BE76E4BA2}" dt="2025-06-18T22:03:50.588" v="14" actId="47"/>
-        <pc:sldMkLst>
-          <pc:docMk/>
-          <pc:sldMk cId="1363089318" sldId="289"/>
-        </pc:sldMkLst>
-      </pc:sldChg>
-      <pc:sldChg chg="del">
-        <pc:chgData name="Chakrawal, Arjun" userId="1b69a048-c6a1-4e41-816d-1e92891910c1" providerId="ADAL" clId="{8F223F2B-44B6-4956-91CA-EF5BE76E4BA2}" dt="2025-06-18T22:03:49.281" v="12" actId="47"/>
-        <pc:sldMkLst>
-          <pc:docMk/>
-          <pc:sldMk cId="1402487664" sldId="290"/>
-        </pc:sldMkLst>
-      </pc:sldChg>
-      <pc:sldChg chg="del">
-        <pc:chgData name="Chakrawal, Arjun" userId="1b69a048-c6a1-4e41-816d-1e92891910c1" providerId="ADAL" clId="{8F223F2B-44B6-4956-91CA-EF5BE76E4BA2}" dt="2025-06-18T22:03:53.450" v="15" actId="47"/>
-        <pc:sldMkLst>
-          <pc:docMk/>
-          <pc:sldMk cId="2553859859" sldId="291"/>
-        </pc:sldMkLst>
-      </pc:sldChg>
-      <pc:sldChg chg="del">
-        <pc:chgData name="Chakrawal, Arjun" userId="1b69a048-c6a1-4e41-816d-1e92891910c1" providerId="ADAL" clId="{8F223F2B-44B6-4956-91CA-EF5BE76E4BA2}" dt="2025-06-18T22:03:50.040" v="13" actId="47"/>
-        <pc:sldMkLst>
-          <pc:docMk/>
-          <pc:sldMk cId="2935536768" sldId="292"/>
-        </pc:sldMkLst>
-      </pc:sldChg>
-      <pc:sldChg chg="modSp mod">
-        <pc:chgData name="Chakrawal, Arjun" userId="1b69a048-c6a1-4e41-816d-1e92891910c1" providerId="ADAL" clId="{8F223F2B-44B6-4956-91CA-EF5BE76E4BA2}" dt="2025-06-18T22:05:43.147" v="48" actId="1076"/>
-        <pc:sldMkLst>
-          <pc:docMk/>
-          <pc:sldMk cId="3794856077" sldId="293"/>
-        </pc:sldMkLst>
-        <pc:grpChg chg="mod">
-          <ac:chgData name="Chakrawal, Arjun" userId="1b69a048-c6a1-4e41-816d-1e92891910c1" providerId="ADAL" clId="{8F223F2B-44B6-4956-91CA-EF5BE76E4BA2}" dt="2025-06-18T22:05:43.147" v="48" actId="1076"/>
+        <pc:grpChg chg="del">
+          <ac:chgData name="Chakrawal, Arjun" userId="1b69a048-c6a1-4e41-816d-1e92891910c1" providerId="ADAL" clId="{CCC3BBF2-12F1-464E-BA5E-AA5BA086ED71}" dt="2026-02-07T19:06:12.887" v="1" actId="165"/>
           <ac:grpSpMkLst>
             <pc:docMk/>
-            <pc:sldMk cId="3794856077" sldId="293"/>
-            <ac:grpSpMk id="10" creationId="{B2D7174E-4ECC-3514-6929-2BC063FB2194}"/>
-          </ac:grpSpMkLst>
-        </pc:grpChg>
-      </pc:sldChg>
-      <pc:sldChg chg="del">
-        <pc:chgData name="Chakrawal, Arjun" userId="1b69a048-c6a1-4e41-816d-1e92891910c1" providerId="ADAL" clId="{8F223F2B-44B6-4956-91CA-EF5BE76E4BA2}" dt="2025-06-18T22:03:54.413" v="16" actId="47"/>
-        <pc:sldMkLst>
-          <pc:docMk/>
-          <pc:sldMk cId="387838259" sldId="294"/>
-        </pc:sldMkLst>
-      </pc:sldChg>
-      <pc:sldChg chg="del">
-        <pc:chgData name="Chakrawal, Arjun" userId="1b69a048-c6a1-4e41-816d-1e92891910c1" providerId="ADAL" clId="{8F223F2B-44B6-4956-91CA-EF5BE76E4BA2}" dt="2025-06-18T22:03:54.916" v="17" actId="47"/>
-        <pc:sldMkLst>
-          <pc:docMk/>
-          <pc:sldMk cId="1383249" sldId="295"/>
-        </pc:sldMkLst>
-      </pc:sldChg>
-      <pc:sldChg chg="del">
-        <pc:chgData name="Chakrawal, Arjun" userId="1b69a048-c6a1-4e41-816d-1e92891910c1" providerId="ADAL" clId="{8F223F2B-44B6-4956-91CA-EF5BE76E4BA2}" dt="2025-06-18T22:03:57.526" v="18" actId="47"/>
-        <pc:sldMkLst>
-          <pc:docMk/>
-          <pc:sldMk cId="2653322492" sldId="296"/>
-        </pc:sldMkLst>
-      </pc:sldChg>
-      <pc:sldChg chg="del">
-        <pc:chgData name="Chakrawal, Arjun" userId="1b69a048-c6a1-4e41-816d-1e92891910c1" providerId="ADAL" clId="{8F223F2B-44B6-4956-91CA-EF5BE76E4BA2}" dt="2025-06-18T22:04:02.638" v="20" actId="47"/>
-        <pc:sldMkLst>
-          <pc:docMk/>
-          <pc:sldMk cId="3410615842" sldId="297"/>
-        </pc:sldMkLst>
-      </pc:sldChg>
-      <pc:sldChg chg="del">
-        <pc:chgData name="Chakrawal, Arjun" userId="1b69a048-c6a1-4e41-816d-1e92891910c1" providerId="ADAL" clId="{8F223F2B-44B6-4956-91CA-EF5BE76E4BA2}" dt="2025-06-18T22:03:58.443" v="19" actId="47"/>
-        <pc:sldMkLst>
-          <pc:docMk/>
-          <pc:sldMk cId="66919463" sldId="298"/>
-        </pc:sldMkLst>
-      </pc:sldChg>
-      <pc:sldChg chg="addSp delSp modSp mod">
-        <pc:chgData name="Chakrawal, Arjun" userId="1b69a048-c6a1-4e41-816d-1e92891910c1" providerId="ADAL" clId="{8F223F2B-44B6-4956-91CA-EF5BE76E4BA2}" dt="2025-06-28T05:09:32.296" v="70" actId="21"/>
-        <pc:sldMkLst>
-          <pc:docMk/>
-          <pc:sldMk cId="2091496340" sldId="299"/>
-        </pc:sldMkLst>
-        <pc:spChg chg="mod topLvl">
-          <ac:chgData name="Chakrawal, Arjun" userId="1b69a048-c6a1-4e41-816d-1e92891910c1" providerId="ADAL" clId="{8F223F2B-44B6-4956-91CA-EF5BE76E4BA2}" dt="2025-06-28T05:09:17.578" v="67" actId="164"/>
-          <ac:spMkLst>
-            <pc:docMk/>
-            <pc:sldMk cId="2091496340" sldId="299"/>
-            <ac:spMk id="22" creationId="{713C7CC1-FD2B-0AB8-2570-DF103B4B35FA}"/>
-          </ac:spMkLst>
-        </pc:spChg>
-        <pc:spChg chg="mod topLvl">
-          <ac:chgData name="Chakrawal, Arjun" userId="1b69a048-c6a1-4e41-816d-1e92891910c1" providerId="ADAL" clId="{8F223F2B-44B6-4956-91CA-EF5BE76E4BA2}" dt="2025-06-28T05:09:17.578" v="67" actId="164"/>
-          <ac:spMkLst>
-            <pc:docMk/>
-            <pc:sldMk cId="2091496340" sldId="299"/>
-            <ac:spMk id="23" creationId="{D6E2C1AA-4709-3D59-0DA1-23D72EC222A8}"/>
-          </ac:spMkLst>
-        </pc:spChg>
-        <pc:picChg chg="mod topLvl">
-          <ac:chgData name="Chakrawal, Arjun" userId="1b69a048-c6a1-4e41-816d-1e92891910c1" providerId="ADAL" clId="{8F223F2B-44B6-4956-91CA-EF5BE76E4BA2}" dt="2025-06-28T05:09:17.578" v="67" actId="164"/>
-          <ac:picMkLst>
-            <pc:docMk/>
-            <pc:sldMk cId="2091496340" sldId="299"/>
-            <ac:picMk id="20" creationId="{E395A346-2E55-A5C9-E740-DC5D35FD4464}"/>
-          </ac:picMkLst>
-        </pc:picChg>
-      </pc:sldChg>
-      <pc:sldChg chg="new del">
-        <pc:chgData name="Chakrawal, Arjun" userId="1b69a048-c6a1-4e41-816d-1e92891910c1" providerId="ADAL" clId="{8F223F2B-44B6-4956-91CA-EF5BE76E4BA2}" dt="2025-06-18T22:05:11.944" v="42" actId="47"/>
-        <pc:sldMkLst>
-          <pc:docMk/>
-          <pc:sldMk cId="373611914" sldId="300"/>
-        </pc:sldMkLst>
-      </pc:sldChg>
-    </pc:docChg>
-  </pc:docChgLst>
-  <pc:docChgLst>
-    <pc:chgData name="Chakrawal, Arjun" userId="1b69a048-c6a1-4e41-816d-1e92891910c1" providerId="ADAL" clId="{855BA7DE-2D75-4513-A731-CBA34181A4D5}"/>
-    <pc:docChg chg="custSel addSld modSld">
-      <pc:chgData name="Chakrawal, Arjun" userId="1b69a048-c6a1-4e41-816d-1e92891910c1" providerId="ADAL" clId="{855BA7DE-2D75-4513-A731-CBA34181A4D5}" dt="2025-02-12T11:15:01.611" v="8" actId="22"/>
-      <pc:docMkLst>
-        <pc:docMk/>
-      </pc:docMkLst>
-      <pc:sldChg chg="addSp delSp new mod">
-        <pc:chgData name="Chakrawal, Arjun" userId="1b69a048-c6a1-4e41-816d-1e92891910c1" providerId="ADAL" clId="{855BA7DE-2D75-4513-A731-CBA34181A4D5}" dt="2025-02-12T11:13:07.426" v="2" actId="22"/>
-        <pc:sldMkLst>
-          <pc:docMk/>
-          <pc:sldMk cId="2948450377" sldId="256"/>
-        </pc:sldMkLst>
-      </pc:sldChg>
-      <pc:sldChg chg="addSp delSp new mod">
-        <pc:chgData name="Chakrawal, Arjun" userId="1b69a048-c6a1-4e41-816d-1e92891910c1" providerId="ADAL" clId="{855BA7DE-2D75-4513-A731-CBA34181A4D5}" dt="2025-02-12T11:14:09.412" v="5" actId="22"/>
-        <pc:sldMkLst>
-          <pc:docMk/>
-          <pc:sldMk cId="2637590116" sldId="257"/>
-        </pc:sldMkLst>
-      </pc:sldChg>
-      <pc:sldChg chg="addSp delSp new mod">
-        <pc:chgData name="Chakrawal, Arjun" userId="1b69a048-c6a1-4e41-816d-1e92891910c1" providerId="ADAL" clId="{855BA7DE-2D75-4513-A731-CBA34181A4D5}" dt="2025-02-12T11:15:01.611" v="8" actId="22"/>
-        <pc:sldMkLst>
-          <pc:docMk/>
-          <pc:sldMk cId="91093646" sldId="258"/>
-        </pc:sldMkLst>
-      </pc:sldChg>
-    </pc:docChg>
-  </pc:docChgLst>
-  <pc:docChgLst>
-    <pc:chgData name="Chakrawal, Arjun" userId="1b69a048-c6a1-4e41-816d-1e92891910c1" providerId="ADAL" clId="{FC699522-0B27-4A4A-9B4C-56029935AEF4}"/>
-    <pc:docChg chg="undo custSel addSld modSld">
-      <pc:chgData name="Chakrawal, Arjun" userId="1b69a048-c6a1-4e41-816d-1e92891910c1" providerId="ADAL" clId="{FC699522-0B27-4A4A-9B4C-56029935AEF4}" dt="2025-06-09T20:51:16.089" v="390" actId="21"/>
-      <pc:docMkLst>
-        <pc:docMk/>
-      </pc:docMkLst>
-      <pc:sldChg chg="modSp mod">
-        <pc:chgData name="Chakrawal, Arjun" userId="1b69a048-c6a1-4e41-816d-1e92891910c1" providerId="ADAL" clId="{FC699522-0B27-4A4A-9B4C-56029935AEF4}" dt="2025-06-05T17:18:40.640" v="0" actId="1076"/>
-        <pc:sldMkLst>
-          <pc:docMk/>
-          <pc:sldMk cId="1619352745" sldId="288"/>
-        </pc:sldMkLst>
-      </pc:sldChg>
-      <pc:sldChg chg="modSp mod">
-        <pc:chgData name="Chakrawal, Arjun" userId="1b69a048-c6a1-4e41-816d-1e92891910c1" providerId="ADAL" clId="{FC699522-0B27-4A4A-9B4C-56029935AEF4}" dt="2025-06-09T17:52:29.094" v="234" actId="1076"/>
-        <pc:sldMkLst>
-          <pc:docMk/>
-          <pc:sldMk cId="1363089318" sldId="289"/>
-        </pc:sldMkLst>
-      </pc:sldChg>
-      <pc:sldChg chg="addSp delSp modSp new mod">
-        <pc:chgData name="Chakrawal, Arjun" userId="1b69a048-c6a1-4e41-816d-1e92891910c1" providerId="ADAL" clId="{FC699522-0B27-4A4A-9B4C-56029935AEF4}" dt="2025-06-05T17:21:20.204" v="46" actId="21"/>
-        <pc:sldMkLst>
-          <pc:docMk/>
-          <pc:sldMk cId="2935536768" sldId="292"/>
-        </pc:sldMkLst>
-      </pc:sldChg>
-      <pc:sldChg chg="addSp delSp modSp add mod">
-        <pc:chgData name="Chakrawal, Arjun" userId="1b69a048-c6a1-4e41-816d-1e92891910c1" providerId="ADAL" clId="{FC699522-0B27-4A4A-9B4C-56029935AEF4}" dt="2025-06-08T17:38:41.312" v="65" actId="21"/>
-        <pc:sldMkLst>
-          <pc:docMk/>
-          <pc:sldMk cId="3794856077" sldId="293"/>
-        </pc:sldMkLst>
-        <pc:spChg chg="mod topLvl">
-          <ac:chgData name="Chakrawal, Arjun" userId="1b69a048-c6a1-4e41-816d-1e92891910c1" providerId="ADAL" clId="{FC699522-0B27-4A4A-9B4C-56029935AEF4}" dt="2025-06-08T17:38:16.978" v="63" actId="164"/>
-          <ac:spMkLst>
-            <pc:docMk/>
-            <pc:sldMk cId="3794856077" sldId="293"/>
-            <ac:spMk id="33" creationId="{5E68A767-C716-AF7E-C3D0-3EDE6DCFA87B}"/>
-          </ac:spMkLst>
-        </pc:spChg>
-        <pc:spChg chg="mod topLvl">
-          <ac:chgData name="Chakrawal, Arjun" userId="1b69a048-c6a1-4e41-816d-1e92891910c1" providerId="ADAL" clId="{FC699522-0B27-4A4A-9B4C-56029935AEF4}" dt="2025-06-08T17:38:16.978" v="63" actId="164"/>
-          <ac:spMkLst>
-            <pc:docMk/>
-            <pc:sldMk cId="3794856077" sldId="293"/>
-            <ac:spMk id="34" creationId="{2AECA185-F739-F68A-905F-EDD9E9DEC2E8}"/>
-          </ac:spMkLst>
-        </pc:spChg>
-        <pc:spChg chg="mod topLvl">
-          <ac:chgData name="Chakrawal, Arjun" userId="1b69a048-c6a1-4e41-816d-1e92891910c1" providerId="ADAL" clId="{FC699522-0B27-4A4A-9B4C-56029935AEF4}" dt="2025-06-08T17:38:16.978" v="63" actId="164"/>
-          <ac:spMkLst>
-            <pc:docMk/>
-            <pc:sldMk cId="3794856077" sldId="293"/>
-            <ac:spMk id="35" creationId="{E174E746-7D15-EB03-F621-6F1262B1D301}"/>
-          </ac:spMkLst>
-        </pc:spChg>
-        <pc:grpChg chg="mod topLvl">
-          <ac:chgData name="Chakrawal, Arjun" userId="1b69a048-c6a1-4e41-816d-1e92891910c1" providerId="ADAL" clId="{FC699522-0B27-4A4A-9B4C-56029935AEF4}" dt="2025-06-08T17:38:16.978" v="63" actId="164"/>
-          <ac:grpSpMkLst>
-            <pc:docMk/>
-            <pc:sldMk cId="3794856077" sldId="293"/>
-            <ac:grpSpMk id="9" creationId="{0937EF34-D20E-7711-E1F9-09E7D833FF09}"/>
+            <pc:sldMk cId="1333682676" sldId="300"/>
+            <ac:grpSpMk id="3" creationId="{8E86AB21-2CD1-64A9-7CCD-BF5FDBF81DC0}"/>
           </ac:grpSpMkLst>
         </pc:grpChg>
         <pc:grpChg chg="add mod">
-          <ac:chgData name="Chakrawal, Arjun" userId="1b69a048-c6a1-4e41-816d-1e92891910c1" providerId="ADAL" clId="{FC699522-0B27-4A4A-9B4C-56029935AEF4}" dt="2025-06-08T17:38:16.978" v="63" actId="164"/>
+          <ac:chgData name="Chakrawal, Arjun" userId="1b69a048-c6a1-4e41-816d-1e92891910c1" providerId="ADAL" clId="{CCC3BBF2-12F1-464E-BA5E-AA5BA086ED71}" dt="2026-02-07T19:09:45.015" v="41" actId="164"/>
           <ac:grpSpMkLst>
             <pc:docMk/>
-            <pc:sldMk cId="3794856077" sldId="293"/>
-            <ac:grpSpMk id="10" creationId="{B2D7174E-4ECC-3514-6929-2BC063FB2194}"/>
+            <pc:sldMk cId="1333682676" sldId="300"/>
+            <ac:grpSpMk id="8" creationId="{63BEB87E-F0A5-D476-4EB3-5DCF622C3D0F}"/>
           </ac:grpSpMkLst>
         </pc:grpChg>
-        <pc:picChg chg="mod topLvl">
-          <ac:chgData name="Chakrawal, Arjun" userId="1b69a048-c6a1-4e41-816d-1e92891910c1" providerId="ADAL" clId="{FC699522-0B27-4A4A-9B4C-56029935AEF4}" dt="2025-06-08T17:38:16.978" v="63" actId="164"/>
-          <ac:picMkLst>
-            <pc:docMk/>
-            <pc:sldMk cId="3794856077" sldId="293"/>
-            <ac:picMk id="3" creationId="{C94BACF9-8555-D8E0-8540-021E4CDBEE13}"/>
-          </ac:picMkLst>
-        </pc:picChg>
-        <pc:picChg chg="add mod ord">
-          <ac:chgData name="Chakrawal, Arjun" userId="1b69a048-c6a1-4e41-816d-1e92891910c1" providerId="ADAL" clId="{FC699522-0B27-4A4A-9B4C-56029935AEF4}" dt="2025-06-08T17:38:16.978" v="63" actId="164"/>
-          <ac:picMkLst>
-            <pc:docMk/>
-            <pc:sldMk cId="3794856077" sldId="293"/>
-            <ac:picMk id="8" creationId="{929BE9B2-B37E-741F-FD45-EA5AF5E98516}"/>
-          </ac:picMkLst>
-        </pc:picChg>
-        <pc:picChg chg="mod topLvl">
-          <ac:chgData name="Chakrawal, Arjun" userId="1b69a048-c6a1-4e41-816d-1e92891910c1" providerId="ADAL" clId="{FC699522-0B27-4A4A-9B4C-56029935AEF4}" dt="2025-06-08T17:38:16.978" v="63" actId="164"/>
-          <ac:picMkLst>
-            <pc:docMk/>
-            <pc:sldMk cId="3794856077" sldId="293"/>
-            <ac:picMk id="13" creationId="{DBFC78EB-FFEB-495F-E5D3-6EF900F94858}"/>
-          </ac:picMkLst>
-        </pc:picChg>
-        <pc:picChg chg="mod">
-          <ac:chgData name="Chakrawal, Arjun" userId="1b69a048-c6a1-4e41-816d-1e92891910c1" providerId="ADAL" clId="{FC699522-0B27-4A4A-9B4C-56029935AEF4}" dt="2025-06-08T17:37:47.320" v="57" actId="165"/>
-          <ac:picMkLst>
-            <pc:docMk/>
-            <pc:sldMk cId="3794856077" sldId="293"/>
-            <ac:picMk id="15" creationId="{FAF6BB45-5836-B269-F317-0A833DE3107A}"/>
-          </ac:picMkLst>
-        </pc:picChg>
-        <pc:picChg chg="mod">
-          <ac:chgData name="Chakrawal, Arjun" userId="1b69a048-c6a1-4e41-816d-1e92891910c1" providerId="ADAL" clId="{FC699522-0B27-4A4A-9B4C-56029935AEF4}" dt="2025-06-08T17:37:47.320" v="57" actId="165"/>
-          <ac:picMkLst>
-            <pc:docMk/>
-            <pc:sldMk cId="3794856077" sldId="293"/>
-            <ac:picMk id="17" creationId="{834F7591-9054-50A6-158C-A63F11D769C3}"/>
-          </ac:picMkLst>
-        </pc:picChg>
-        <pc:picChg chg="mod topLvl">
-          <ac:chgData name="Chakrawal, Arjun" userId="1b69a048-c6a1-4e41-816d-1e92891910c1" providerId="ADAL" clId="{FC699522-0B27-4A4A-9B4C-56029935AEF4}" dt="2025-06-08T17:38:16.978" v="63" actId="164"/>
-          <ac:picMkLst>
-            <pc:docMk/>
-            <pc:sldMk cId="3794856077" sldId="293"/>
-            <ac:picMk id="41" creationId="{D8E86162-1F59-10B8-84F4-406811224D78}"/>
-          </ac:picMkLst>
-        </pc:picChg>
-      </pc:sldChg>
-      <pc:sldChg chg="addSp delSp modSp new mod">
-        <pc:chgData name="Chakrawal, Arjun" userId="1b69a048-c6a1-4e41-816d-1e92891910c1" providerId="ADAL" clId="{FC699522-0B27-4A4A-9B4C-56029935AEF4}" dt="2025-06-08T20:21:31.681" v="141" actId="21"/>
-        <pc:sldMkLst>
-          <pc:docMk/>
-          <pc:sldMk cId="387838259" sldId="294"/>
-        </pc:sldMkLst>
-      </pc:sldChg>
-      <pc:sldChg chg="addSp delSp modSp add mod">
-        <pc:chgData name="Chakrawal, Arjun" userId="1b69a048-c6a1-4e41-816d-1e92891910c1" providerId="ADAL" clId="{FC699522-0B27-4A4A-9B4C-56029935AEF4}" dt="2025-06-08T20:34:30.704" v="147" actId="21"/>
-        <pc:sldMkLst>
-          <pc:docMk/>
-          <pc:sldMk cId="1383249" sldId="295"/>
-        </pc:sldMkLst>
-      </pc:sldChg>
-      <pc:sldChg chg="addSp delSp modSp add mod">
-        <pc:chgData name="Chakrawal, Arjun" userId="1b69a048-c6a1-4e41-816d-1e92891910c1" providerId="ADAL" clId="{FC699522-0B27-4A4A-9B4C-56029935AEF4}" dt="2025-06-09T16:49:51.690" v="208" actId="21"/>
-        <pc:sldMkLst>
-          <pc:docMk/>
-          <pc:sldMk cId="2653322492" sldId="296"/>
-        </pc:sldMkLst>
-      </pc:sldChg>
-      <pc:sldChg chg="addSp delSp modSp new mod">
-        <pc:chgData name="Chakrawal, Arjun" userId="1b69a048-c6a1-4e41-816d-1e92891910c1" providerId="ADAL" clId="{FC699522-0B27-4A4A-9B4C-56029935AEF4}" dt="2025-06-09T20:10:56.828" v="373" actId="1582"/>
-        <pc:sldMkLst>
-          <pc:docMk/>
-          <pc:sldMk cId="3410615842" sldId="297"/>
-        </pc:sldMkLst>
-      </pc:sldChg>
-      <pc:sldChg chg="addSp delSp modSp add mod">
-        <pc:chgData name="Chakrawal, Arjun" userId="1b69a048-c6a1-4e41-816d-1e92891910c1" providerId="ADAL" clId="{FC699522-0B27-4A4A-9B4C-56029935AEF4}" dt="2025-06-09T17:31:24.820" v="233" actId="21"/>
-        <pc:sldMkLst>
-          <pc:docMk/>
-          <pc:sldMk cId="66919463" sldId="298"/>
-        </pc:sldMkLst>
-      </pc:sldChg>
-      <pc:sldChg chg="addSp delSp modSp add mod">
-        <pc:chgData name="Chakrawal, Arjun" userId="1b69a048-c6a1-4e41-816d-1e92891910c1" providerId="ADAL" clId="{FC699522-0B27-4A4A-9B4C-56029935AEF4}" dt="2025-06-09T20:51:16.089" v="390" actId="21"/>
-        <pc:sldMkLst>
-          <pc:docMk/>
-          <pc:sldMk cId="2091496340" sldId="299"/>
-        </pc:sldMkLst>
-        <pc:picChg chg="add mod">
-          <ac:chgData name="Chakrawal, Arjun" userId="1b69a048-c6a1-4e41-816d-1e92891910c1" providerId="ADAL" clId="{FC699522-0B27-4A4A-9B4C-56029935AEF4}" dt="2025-06-09T20:50:06.738" v="382" actId="1076"/>
-          <ac:picMkLst>
-            <pc:docMk/>
-            <pc:sldMk cId="2091496340" sldId="299"/>
-            <ac:picMk id="20" creationId="{E395A346-2E55-A5C9-E740-DC5D35FD4464}"/>
-          </ac:picMkLst>
-        </pc:picChg>
-      </pc:sldChg>
-    </pc:docChg>
-  </pc:docChgLst>
-  <pc:docChgLst>
-    <pc:chgData name="Chakrawal, Arjun" userId="1b69a048-c6a1-4e41-816d-1e92891910c1" providerId="ADAL" clId="{6E3E3B4A-B4B0-4707-AE81-0723FF1D7A8D}"/>
-    <pc:docChg chg="undo redo custSel addSld modSld">
-      <pc:chgData name="Chakrawal, Arjun" userId="1b69a048-c6a1-4e41-816d-1e92891910c1" providerId="ADAL" clId="{6E3E3B4A-B4B0-4707-AE81-0723FF1D7A8D}" dt="2025-04-21T19:55:47.606" v="549" actId="164"/>
-      <pc:docMkLst>
-        <pc:docMk/>
-      </pc:docMkLst>
-      <pc:sldChg chg="addSp modSp add mod">
-        <pc:chgData name="Chakrawal, Arjun" userId="1b69a048-c6a1-4e41-816d-1e92891910c1" providerId="ADAL" clId="{6E3E3B4A-B4B0-4707-AE81-0723FF1D7A8D}" dt="2025-04-21T19:55:47.606" v="549" actId="164"/>
-        <pc:sldMkLst>
-          <pc:docMk/>
-          <pc:sldMk cId="3322854550" sldId="260"/>
-        </pc:sldMkLst>
-      </pc:sldChg>
-      <pc:sldChg chg="addSp delSp modSp mod">
-        <pc:chgData name="Chakrawal, Arjun" userId="1b69a048-c6a1-4e41-816d-1e92891910c1" providerId="ADAL" clId="{6E3E3B4A-B4B0-4707-AE81-0723FF1D7A8D}" dt="2025-04-15T22:37:44.755" v="170" actId="21"/>
-        <pc:sldMkLst>
-          <pc:docMk/>
-          <pc:sldMk cId="208848701" sldId="272"/>
-        </pc:sldMkLst>
-      </pc:sldChg>
-      <pc:sldChg chg="addSp delSp modSp mod">
-        <pc:chgData name="Chakrawal, Arjun" userId="1b69a048-c6a1-4e41-816d-1e92891910c1" providerId="ADAL" clId="{6E3E3B4A-B4B0-4707-AE81-0723FF1D7A8D}" dt="2025-04-11T08:53:39.198" v="133" actId="21"/>
-        <pc:sldMkLst>
-          <pc:docMk/>
-          <pc:sldMk cId="2066281192" sldId="287"/>
-        </pc:sldMkLst>
-      </pc:sldChg>
-      <pc:sldChg chg="addSp delSp modSp mod">
-        <pc:chgData name="Chakrawal, Arjun" userId="1b69a048-c6a1-4e41-816d-1e92891910c1" providerId="ADAL" clId="{6E3E3B4A-B4B0-4707-AE81-0723FF1D7A8D}" dt="2025-04-11T08:51:38.094" v="116" actId="21"/>
-        <pc:sldMkLst>
-          <pc:docMk/>
-          <pc:sldMk cId="1402487664" sldId="290"/>
-        </pc:sldMkLst>
-      </pc:sldChg>
-      <pc:sldChg chg="addSp delSp modSp new mod">
-        <pc:chgData name="Chakrawal, Arjun" userId="1b69a048-c6a1-4e41-816d-1e92891910c1" providerId="ADAL" clId="{6E3E3B4A-B4B0-4707-AE81-0723FF1D7A8D}" dt="2025-04-11T08:27:13.258" v="80" actId="21"/>
-        <pc:sldMkLst>
-          <pc:docMk/>
-          <pc:sldMk cId="2553859859" sldId="291"/>
-        </pc:sldMkLst>
-      </pc:sldChg>
-    </pc:docChg>
-  </pc:docChgLst>
-  <pc:docChgLst>
-    <pc:chgData name="Chakrawal, Arjun" userId="1b69a048-c6a1-4e41-816d-1e92891910c1" providerId="ADAL" clId="{E843F3A2-BFE6-4BE8-8FEA-88B1DC1072B5}"/>
-    <pc:docChg chg="custSel modSld">
-      <pc:chgData name="Chakrawal, Arjun" userId="1b69a048-c6a1-4e41-816d-1e92891910c1" providerId="ADAL" clId="{E843F3A2-BFE6-4BE8-8FEA-88B1DC1072B5}" dt="2025-07-03T18:37:13.241" v="34" actId="21"/>
-      <pc:docMkLst>
-        <pc:docMk/>
-      </pc:docMkLst>
-      <pc:sldChg chg="addSp delSp modSp mod">
-        <pc:chgData name="Chakrawal, Arjun" userId="1b69a048-c6a1-4e41-816d-1e92891910c1" providerId="ADAL" clId="{E843F3A2-BFE6-4BE8-8FEA-88B1DC1072B5}" dt="2025-07-03T18:37:13.241" v="34" actId="21"/>
-        <pc:sldMkLst>
-          <pc:docMk/>
-          <pc:sldMk cId="2091496340" sldId="299"/>
-        </pc:sldMkLst>
-        <pc:spChg chg="mod topLvl">
-          <ac:chgData name="Chakrawal, Arjun" userId="1b69a048-c6a1-4e41-816d-1e92891910c1" providerId="ADAL" clId="{E843F3A2-BFE6-4BE8-8FEA-88B1DC1072B5}" dt="2025-07-03T18:37:09.700" v="32" actId="164"/>
-          <ac:spMkLst>
-            <pc:docMk/>
-            <pc:sldMk cId="2091496340" sldId="299"/>
-            <ac:spMk id="22" creationId="{713C7CC1-FD2B-0AB8-2570-DF103B4B35FA}"/>
-          </ac:spMkLst>
-        </pc:spChg>
-        <pc:spChg chg="mod topLvl">
-          <ac:chgData name="Chakrawal, Arjun" userId="1b69a048-c6a1-4e41-816d-1e92891910c1" providerId="ADAL" clId="{E843F3A2-BFE6-4BE8-8FEA-88B1DC1072B5}" dt="2025-07-03T18:37:09.700" v="32" actId="164"/>
-          <ac:spMkLst>
-            <pc:docMk/>
-            <pc:sldMk cId="2091496340" sldId="299"/>
-            <ac:spMk id="23" creationId="{D6E2C1AA-4709-3D59-0DA1-23D72EC222A8}"/>
-          </ac:spMkLst>
-        </pc:spChg>
         <pc:grpChg chg="add mod">
-          <ac:chgData name="Chakrawal, Arjun" userId="1b69a048-c6a1-4e41-816d-1e92891910c1" providerId="ADAL" clId="{E843F3A2-BFE6-4BE8-8FEA-88B1DC1072B5}" dt="2025-07-03T18:37:09.700" v="32" actId="164"/>
+          <ac:chgData name="Chakrawal, Arjun" userId="1b69a048-c6a1-4e41-816d-1e92891910c1" providerId="ADAL" clId="{CCC3BBF2-12F1-464E-BA5E-AA5BA086ED71}" dt="2026-02-07T19:09:51.660" v="42" actId="1076"/>
           <ac:grpSpMkLst>
             <pc:docMk/>
-            <pc:sldMk cId="2091496340" sldId="299"/>
-            <ac:grpSpMk id="14" creationId="{C2FA4C28-3FAD-3C40-5C8A-9A545AA24AD0}"/>
+            <pc:sldMk cId="1333682676" sldId="300"/>
+            <ac:grpSpMk id="9" creationId="{C975CA6B-C298-BE01-B684-2A6FDF3CF6D4}"/>
+          </ac:grpSpMkLst>
+        </pc:grpChg>
+        <pc:grpChg chg="del mod topLvl">
+          <ac:chgData name="Chakrawal, Arjun" userId="1b69a048-c6a1-4e41-816d-1e92891910c1" providerId="ADAL" clId="{CCC3BBF2-12F1-464E-BA5E-AA5BA086ED71}" dt="2026-02-07T19:06:14.841" v="2" actId="165"/>
+          <ac:grpSpMkLst>
+            <pc:docMk/>
+            <pc:sldMk cId="1333682676" sldId="300"/>
+            <ac:grpSpMk id="14" creationId="{79A2CA92-45F4-928D-7FB3-230645E48DB7}"/>
           </ac:grpSpMkLst>
         </pc:grpChg>
         <pc:picChg chg="add mod">
-          <ac:chgData name="Chakrawal, Arjun" userId="1b69a048-c6a1-4e41-816d-1e92891910c1" providerId="ADAL" clId="{E843F3A2-BFE6-4BE8-8FEA-88B1DC1072B5}" dt="2025-07-03T18:37:09.700" v="32" actId="164"/>
+          <ac:chgData name="Chakrawal, Arjun" userId="1b69a048-c6a1-4e41-816d-1e92891910c1" providerId="ADAL" clId="{CCC3BBF2-12F1-464E-BA5E-AA5BA086ED71}" dt="2026-02-07T19:09:16.952" v="21" actId="164"/>
           <ac:picMkLst>
             <pc:docMk/>
-            <pc:sldMk cId="2091496340" sldId="299"/>
-            <ac:picMk id="13" creationId="{B5A0B7D3-9742-3F9E-2651-9B78B75085D9}"/>
+            <pc:sldMk cId="1333682676" sldId="300"/>
+            <ac:picMk id="5" creationId="{FBA505B5-A3A2-FDFB-713D-CF7018633016}"/>
           </ac:picMkLst>
         </pc:picChg>
-        <pc:picChg chg="mod topLvl">
-          <ac:chgData name="Chakrawal, Arjun" userId="1b69a048-c6a1-4e41-816d-1e92891910c1" providerId="ADAL" clId="{E843F3A2-BFE6-4BE8-8FEA-88B1DC1072B5}" dt="2025-07-03T18:37:09.700" v="32" actId="164"/>
+        <pc:picChg chg="add mod">
+          <ac:chgData name="Chakrawal, Arjun" userId="1b69a048-c6a1-4e41-816d-1e92891910c1" providerId="ADAL" clId="{CCC3BBF2-12F1-464E-BA5E-AA5BA086ED71}" dt="2026-02-07T19:09:16.952" v="21" actId="164"/>
           <ac:picMkLst>
             <pc:docMk/>
-            <pc:sldMk cId="2091496340" sldId="299"/>
-            <ac:picMk id="20" creationId="{E395A346-2E55-A5C9-E740-DC5D35FD4464}"/>
+            <pc:sldMk cId="1333682676" sldId="300"/>
+            <ac:picMk id="7" creationId="{C375B2CA-4361-AFB7-88D2-D35FC618044D}"/>
+          </ac:picMkLst>
+        </pc:picChg>
+        <pc:picChg chg="add del">
+          <ac:chgData name="Chakrawal, Arjun" userId="1b69a048-c6a1-4e41-816d-1e92891910c1" providerId="ADAL" clId="{CCC3BBF2-12F1-464E-BA5E-AA5BA086ED71}" dt="2026-02-07T19:09:56.592" v="44" actId="21"/>
+          <ac:picMkLst>
+            <pc:docMk/>
+            <pc:sldMk cId="1333682676" sldId="300"/>
+            <ac:picMk id="10" creationId="{3132298E-65C8-9899-DC57-55CD4FEA6039}"/>
+          </ac:picMkLst>
+        </pc:picChg>
+        <pc:picChg chg="del mod topLvl">
+          <ac:chgData name="Chakrawal, Arjun" userId="1b69a048-c6a1-4e41-816d-1e92891910c1" providerId="ADAL" clId="{CCC3BBF2-12F1-464E-BA5E-AA5BA086ED71}" dt="2026-02-07T19:08:51.529" v="17" actId="478"/>
+          <ac:picMkLst>
+            <pc:docMk/>
+            <pc:sldMk cId="1333682676" sldId="300"/>
+            <ac:picMk id="13" creationId="{DCDFF630-DEB4-906F-2742-62C921EB4DDA}"/>
+          </ac:picMkLst>
+        </pc:picChg>
+        <pc:picChg chg="del mod topLvl">
+          <ac:chgData name="Chakrawal, Arjun" userId="1b69a048-c6a1-4e41-816d-1e92891910c1" providerId="ADAL" clId="{CCC3BBF2-12F1-464E-BA5E-AA5BA086ED71}" dt="2026-02-07T19:08:51.529" v="17" actId="478"/>
+          <ac:picMkLst>
+            <pc:docMk/>
+            <pc:sldMk cId="1333682676" sldId="300"/>
+            <ac:picMk id="20" creationId="{D85E7F4C-DB31-41C6-6429-44CF58892958}"/>
           </ac:picMkLst>
         </pc:picChg>
       </pc:sldChg>
@@ -891,7 +331,7 @@
           <a:p>
             <a:fld id="{8D39AE16-C143-4EB9-8D6B-9821D100C485}" type="datetimeFigureOut">
               <a:rPr lang="en-US" smtClean="0"/>
-              <a:t>7/30/2025</a:t>
+              <a:t>2/7/2026</a:t>
             </a:fld>
             <a:endParaRPr lang="en-US"/>
           </a:p>
@@ -1305,7 +745,7 @@
           <a:p>
             <a:fld id="{61A46C64-95C7-4F2E-97D5-F6C67B583607}" type="datetimeFigureOut">
               <a:rPr lang="en-US" smtClean="0"/>
-              <a:t>7/30/2025</a:t>
+              <a:t>2/7/2026</a:t>
             </a:fld>
             <a:endParaRPr lang="en-US"/>
           </a:p>
@@ -1503,7 +943,7 @@
           <a:p>
             <a:fld id="{61A46C64-95C7-4F2E-97D5-F6C67B583607}" type="datetimeFigureOut">
               <a:rPr lang="en-US" smtClean="0"/>
-              <a:t>7/30/2025</a:t>
+              <a:t>2/7/2026</a:t>
             </a:fld>
             <a:endParaRPr lang="en-US"/>
           </a:p>
@@ -1711,7 +1151,7 @@
           <a:p>
             <a:fld id="{61A46C64-95C7-4F2E-97D5-F6C67B583607}" type="datetimeFigureOut">
               <a:rPr lang="en-US" smtClean="0"/>
-              <a:t>7/30/2025</a:t>
+              <a:t>2/7/2026</a:t>
             </a:fld>
             <a:endParaRPr lang="en-US"/>
           </a:p>
@@ -1909,7 +1349,7 @@
           <a:p>
             <a:fld id="{61A46C64-95C7-4F2E-97D5-F6C67B583607}" type="datetimeFigureOut">
               <a:rPr lang="en-US" smtClean="0"/>
-              <a:t>7/30/2025</a:t>
+              <a:t>2/7/2026</a:t>
             </a:fld>
             <a:endParaRPr lang="en-US"/>
           </a:p>
@@ -2184,7 +1624,7 @@
           <a:p>
             <a:fld id="{61A46C64-95C7-4F2E-97D5-F6C67B583607}" type="datetimeFigureOut">
               <a:rPr lang="en-US" smtClean="0"/>
-              <a:t>7/30/2025</a:t>
+              <a:t>2/7/2026</a:t>
             </a:fld>
             <a:endParaRPr lang="en-US"/>
           </a:p>
@@ -2449,7 +1889,7 @@
           <a:p>
             <a:fld id="{61A46C64-95C7-4F2E-97D5-F6C67B583607}" type="datetimeFigureOut">
               <a:rPr lang="en-US" smtClean="0"/>
-              <a:t>7/30/2025</a:t>
+              <a:t>2/7/2026</a:t>
             </a:fld>
             <a:endParaRPr lang="en-US"/>
           </a:p>
@@ -2861,7 +2301,7 @@
           <a:p>
             <a:fld id="{61A46C64-95C7-4F2E-97D5-F6C67B583607}" type="datetimeFigureOut">
               <a:rPr lang="en-US" smtClean="0"/>
-              <a:t>7/30/2025</a:t>
+              <a:t>2/7/2026</a:t>
             </a:fld>
             <a:endParaRPr lang="en-US"/>
           </a:p>
@@ -3002,7 +2442,7 @@
           <a:p>
             <a:fld id="{61A46C64-95C7-4F2E-97D5-F6C67B583607}" type="datetimeFigureOut">
               <a:rPr lang="en-US" smtClean="0"/>
-              <a:t>7/30/2025</a:t>
+              <a:t>2/7/2026</a:t>
             </a:fld>
             <a:endParaRPr lang="en-US"/>
           </a:p>
@@ -3115,7 +2555,7 @@
           <a:p>
             <a:fld id="{61A46C64-95C7-4F2E-97D5-F6C67B583607}" type="datetimeFigureOut">
               <a:rPr lang="en-US" smtClean="0"/>
-              <a:t>7/30/2025</a:t>
+              <a:t>2/7/2026</a:t>
             </a:fld>
             <a:endParaRPr lang="en-US"/>
           </a:p>
@@ -3426,7 +2866,7 @@
           <a:p>
             <a:fld id="{61A46C64-95C7-4F2E-97D5-F6C67B583607}" type="datetimeFigureOut">
               <a:rPr lang="en-US" smtClean="0"/>
-              <a:t>7/30/2025</a:t>
+              <a:t>2/7/2026</a:t>
             </a:fld>
             <a:endParaRPr lang="en-US"/>
           </a:p>
@@ -3714,7 +3154,7 @@
           <a:p>
             <a:fld id="{61A46C64-95C7-4F2E-97D5-F6C67B583607}" type="datetimeFigureOut">
               <a:rPr lang="en-US" smtClean="0"/>
-              <a:t>7/30/2025</a:t>
+              <a:t>2/7/2026</a:t>
             </a:fld>
             <a:endParaRPr lang="en-US"/>
           </a:p>
@@ -3955,7 +3395,7 @@
           <a:p>
             <a:fld id="{61A46C64-95C7-4F2E-97D5-F6C67B583607}" type="datetimeFigureOut">
               <a:rPr lang="en-US" smtClean="0"/>
-              <a:t>7/30/2025</a:t>
+              <a:t>2/7/2026</a:t>
             </a:fld>
             <a:endParaRPr lang="en-US"/>
           </a:p>
@@ -5836,7 +5276,7 @@
         <p:cNvPr id="1" name="">
           <a:extLst>
             <a:ext uri="{FF2B5EF4-FFF2-40B4-BE49-F238E27FC236}">
-              <a16:creationId xmlns:a16="http://schemas.microsoft.com/office/drawing/2014/main" id="{B63EAE5D-240A-C7C4-FEB3-A2AA95264C7B}"/>
+              <a16:creationId xmlns:a16="http://schemas.microsoft.com/office/drawing/2014/main" id="{225E0044-0555-E481-1876-DD628074D640}"/>
             </a:ext>
           </a:extLst>
         </p:cNvPr>
@@ -5853,10 +5293,10 @@
       </p:grpSpPr>
       <p:grpSp>
         <p:nvGrpSpPr>
-          <p:cNvPr id="3" name="Group 2">
-            <a:extLst>
-              <a:ext uri="{FF2B5EF4-FFF2-40B4-BE49-F238E27FC236}">
-                <a16:creationId xmlns:a16="http://schemas.microsoft.com/office/drawing/2014/main" id="{7C12CCDE-C4F1-17D4-F737-CF6A95A7CDDC}"/>
+          <p:cNvPr id="9" name="Group 8">
+            <a:extLst>
+              <a:ext uri="{FF2B5EF4-FFF2-40B4-BE49-F238E27FC236}">
+                <a16:creationId xmlns:a16="http://schemas.microsoft.com/office/drawing/2014/main" id="{C975CA6B-C298-BE01-B684-2A6FDF3CF6D4}"/>
               </a:ext>
             </a:extLst>
           </p:cNvPr>
@@ -5865,10 +5305,10 @@
         </p:nvGrpSpPr>
         <p:grpSpPr>
           <a:xfrm>
-            <a:off x="-833438" y="-828675"/>
-            <a:ext cx="13858875" cy="4600575"/>
-            <a:chOff x="-914400" y="-790575"/>
-            <a:chExt cx="13858875" cy="4600575"/>
+            <a:off x="-1098200" y="277813"/>
+            <a:ext cx="13858875" cy="4633586"/>
+            <a:chOff x="-475900" y="-547687"/>
+            <a:chExt cx="13858875" cy="4633586"/>
           </a:xfrm>
         </p:grpSpPr>
         <p:sp>
@@ -5876,7 +5316,7 @@
             <p:cNvPr id="2" name="Rectangle 1">
               <a:extLst>
                 <a:ext uri="{FF2B5EF4-FFF2-40B4-BE49-F238E27FC236}">
-                  <a16:creationId xmlns:a16="http://schemas.microsoft.com/office/drawing/2014/main" id="{B87DC352-FDEE-DD67-3BA0-02473E78C1CF}"/>
+                  <a16:creationId xmlns:a16="http://schemas.microsoft.com/office/drawing/2014/main" id="{DA6E867A-F8FB-A328-79F4-A78837510CA0}"/>
                 </a:ext>
               </a:extLst>
             </p:cNvPr>
@@ -5885,8 +5325,8 @@
           </p:nvSpPr>
           <p:spPr>
             <a:xfrm>
-              <a:off x="-914400" y="-790575"/>
-              <a:ext cx="13858875" cy="4600575"/>
+              <a:off x="-475900" y="-546099"/>
+              <a:ext cx="13858875" cy="4631998"/>
             </a:xfrm>
             <a:prstGeom prst="rect">
               <a:avLst/>
@@ -5925,10 +5365,10 @@
         </p:sp>
         <p:grpSp>
           <p:nvGrpSpPr>
-            <p:cNvPr id="14" name="Group 13">
+            <p:cNvPr id="8" name="Group 7">
               <a:extLst>
                 <a:ext uri="{FF2B5EF4-FFF2-40B4-BE49-F238E27FC236}">
-                  <a16:creationId xmlns:a16="http://schemas.microsoft.com/office/drawing/2014/main" id="{C2FA4C28-3FAD-3C40-5C8A-9A545AA24AD0}"/>
+                  <a16:creationId xmlns:a16="http://schemas.microsoft.com/office/drawing/2014/main" id="{63BEB87E-F0A5-D476-4EB3-5DCF622C3D0F}"/>
                 </a:ext>
               </a:extLst>
             </p:cNvPr>
@@ -5937,10 +5377,10 @@
           </p:nvGrpSpPr>
           <p:grpSpPr>
             <a:xfrm>
-              <a:off x="-860078" y="-685800"/>
-              <a:ext cx="13755814" cy="4453870"/>
-              <a:chOff x="-860078" y="-685800"/>
-              <a:chExt cx="13755814" cy="4453870"/>
+              <a:off x="-475900" y="-547687"/>
+              <a:ext cx="13813536" cy="4440663"/>
+              <a:chOff x="-475900" y="-495300"/>
+              <a:chExt cx="13813536" cy="4440663"/>
             </a:xfrm>
           </p:grpSpPr>
           <p:sp>
@@ -5948,7 +5388,7 @@
               <p:cNvPr id="22" name="TextBox 21">
                 <a:extLst>
                   <a:ext uri="{FF2B5EF4-FFF2-40B4-BE49-F238E27FC236}">
-                    <a16:creationId xmlns:a16="http://schemas.microsoft.com/office/drawing/2014/main" id="{713C7CC1-FD2B-0AB8-2570-DF103B4B35FA}"/>
+                    <a16:creationId xmlns:a16="http://schemas.microsoft.com/office/drawing/2014/main" id="{D08B6605-DE80-537C-6C16-A423B3CD9F31}"/>
                   </a:ext>
                 </a:extLst>
               </p:cNvPr>
@@ -5957,7 +5397,7 @@
             </p:nvSpPr>
             <p:spPr>
               <a:xfrm>
-                <a:off x="2232275" y="-685800"/>
+                <a:off x="2617167" y="-495300"/>
                 <a:ext cx="607859" cy="523220"/>
               </a:xfrm>
               <a:prstGeom prst="rect">
@@ -5983,7 +5423,7 @@
               <p:cNvPr id="23" name="TextBox 22">
                 <a:extLst>
                   <a:ext uri="{FF2B5EF4-FFF2-40B4-BE49-F238E27FC236}">
-                    <a16:creationId xmlns:a16="http://schemas.microsoft.com/office/drawing/2014/main" id="{D6E2C1AA-4709-3D59-0DA1-23D72EC222A8}"/>
+                    <a16:creationId xmlns:a16="http://schemas.microsoft.com/office/drawing/2014/main" id="{0EDA72DF-FC57-3EDD-763F-2B7F799B270A}"/>
                   </a:ext>
                 </a:extLst>
               </p:cNvPr>
@@ -5992,7 +5432,7 @@
             </p:nvSpPr>
             <p:spPr>
               <a:xfrm>
-                <a:off x="9102221" y="-685800"/>
+                <a:off x="9629734" y="-495300"/>
                 <a:ext cx="612668" cy="523220"/>
               </a:xfrm>
               <a:prstGeom prst="rect">
@@ -6015,10 +5455,10 @@
           </p:sp>
           <p:pic>
             <p:nvPicPr>
-              <p:cNvPr id="20" name="Picture 19">
+              <p:cNvPr id="5" name="Picture 4" descr="Chart, scatter chart&#10;&#10;AI-generated content may be incorrect.">
                 <a:extLst>
                   <a:ext uri="{FF2B5EF4-FFF2-40B4-BE49-F238E27FC236}">
-                    <a16:creationId xmlns:a16="http://schemas.microsoft.com/office/drawing/2014/main" id="{E395A346-2E55-A5C9-E740-DC5D35FD4464}"/>
+                    <a16:creationId xmlns:a16="http://schemas.microsoft.com/office/drawing/2014/main" id="{FBA505B5-A3A2-FDFB-713D-CF7018633016}"/>
                   </a:ext>
                 </a:extLst>
               </p:cNvPr>
@@ -6028,15 +5468,21 @@
               <p:nvPr/>
             </p:nvPicPr>
             <p:blipFill>
-              <a:blip r:embed="rId2"/>
+              <a:blip r:embed="rId2">
+                <a:extLst>
+                  <a:ext uri="{28A0092B-C50C-407E-A947-70E740481C1C}">
+                    <a14:useLocalDpi xmlns:a14="http://schemas.microsoft.com/office/drawing/2010/main" val="0"/>
+                  </a:ext>
+                </a:extLst>
+              </a:blip>
               <a:stretch>
                 <a:fillRect/>
               </a:stretch>
             </p:blipFill>
             <p:spPr>
               <a:xfrm>
-                <a:off x="-860078" y="-162580"/>
-                <a:ext cx="6792565" cy="3930650"/>
+                <a:off x="-475900" y="0"/>
+                <a:ext cx="6793992" cy="3945363"/>
               </a:xfrm>
               <a:prstGeom prst="rect">
                 <a:avLst/>
@@ -6045,10 +5491,10 @@
           </p:pic>
           <p:pic>
             <p:nvPicPr>
-              <p:cNvPr id="13" name="Picture 12">
+              <p:cNvPr id="7" name="Picture 6" descr="Chart, bar chart&#10;&#10;AI-generated content may be incorrect.">
                 <a:extLst>
                   <a:ext uri="{FF2B5EF4-FFF2-40B4-BE49-F238E27FC236}">
-                    <a16:creationId xmlns:a16="http://schemas.microsoft.com/office/drawing/2014/main" id="{B5A0B7D3-9742-3F9E-2651-9B78B75085D9}"/>
+                    <a16:creationId xmlns:a16="http://schemas.microsoft.com/office/drawing/2014/main" id="{C375B2CA-4361-AFB7-88D2-D35FC618044D}"/>
                   </a:ext>
                 </a:extLst>
               </p:cNvPr>
@@ -6058,15 +5504,21 @@
               <p:nvPr/>
             </p:nvPicPr>
             <p:blipFill>
-              <a:blip r:embed="rId3"/>
+              <a:blip r:embed="rId3">
+                <a:extLst>
+                  <a:ext uri="{28A0092B-C50C-407E-A947-70E740481C1C}">
+                    <a14:useLocalDpi xmlns:a14="http://schemas.microsoft.com/office/drawing/2010/main" val="0"/>
+                  </a:ext>
+                </a:extLst>
+              </a:blip>
               <a:stretch>
                 <a:fillRect/>
               </a:stretch>
             </p:blipFill>
             <p:spPr>
               <a:xfrm>
-                <a:off x="6096000" y="-162581"/>
-                <a:ext cx="6799736" cy="3930649"/>
+                <a:off x="6534500" y="12749"/>
+                <a:ext cx="6803136" cy="3932614"/>
               </a:xfrm>
               <a:prstGeom prst="rect">
                 <a:avLst/>
@@ -6078,7 +5530,7 @@
     </p:spTree>
     <p:extLst>
       <p:ext uri="{BB962C8B-B14F-4D97-AF65-F5344CB8AC3E}">
-        <p14:creationId xmlns:p14="http://schemas.microsoft.com/office/powerpoint/2010/main" val="2091496340"/>
+        <p14:creationId xmlns:p14="http://schemas.microsoft.com/office/powerpoint/2010/main" val="1333682676"/>
       </p:ext>
     </p:extLst>
   </p:cSld>

</xml_diff>